<commit_message>
update pp recall score
</commit_message>
<xml_diff>
--- a/Fraud_Detection.pptx
+++ b/Fraud_Detection.pptx
@@ -818,7 +818,7 @@
   <p:cSld>
     <p:spTree>
       <p:nvGrpSpPr>
-        <p:cNvPr id="78" name="Shape 78"/>
+        <p:cNvPr id="79" name="Shape 79"/>
         <p:cNvGrpSpPr/>
         <p:nvPr/>
       </p:nvGrpSpPr>
@@ -832,7 +832,7 @@
       </p:grpSpPr>
       <p:sp>
         <p:nvSpPr>
-          <p:cNvPr id="79" name="Shape 79"/>
+          <p:cNvPr id="80" name="Shape 80"/>
           <p:cNvSpPr/>
           <p:nvPr>
             <p:ph idx="2" type="sldImg"/>
@@ -876,7 +876,7 @@
       </p:sp>
       <p:sp>
         <p:nvSpPr>
-          <p:cNvPr id="80" name="Shape 80"/>
+          <p:cNvPr id="81" name="Shape 81"/>
           <p:cNvSpPr txBox="1"/>
           <p:nvPr>
             <p:ph idx="1" type="body"/>
@@ -923,7 +923,7 @@
   <p:cSld>
     <p:spTree>
       <p:nvGrpSpPr>
-        <p:cNvPr id="86" name="Shape 86"/>
+        <p:cNvPr id="87" name="Shape 87"/>
         <p:cNvGrpSpPr/>
         <p:nvPr/>
       </p:nvGrpSpPr>
@@ -937,7 +937,7 @@
       </p:grpSpPr>
       <p:sp>
         <p:nvSpPr>
-          <p:cNvPr id="87" name="Shape 87"/>
+          <p:cNvPr id="88" name="Shape 88"/>
           <p:cNvSpPr/>
           <p:nvPr>
             <p:ph idx="2" type="sldImg"/>
@@ -981,7 +981,7 @@
       </p:sp>
       <p:sp>
         <p:nvSpPr>
-          <p:cNvPr id="88" name="Shape 88"/>
+          <p:cNvPr id="89" name="Shape 89"/>
           <p:cNvSpPr txBox="1"/>
           <p:nvPr>
             <p:ph idx="1" type="body"/>
@@ -4835,7 +4835,7 @@
             <a:tbl>
               <a:tblPr>
                 <a:noFill/>
-                <a:tableStyleId>{60138C3E-CD7E-4B6B-B1A5-F130F15C237A}</a:tableStyleId>
+                <a:tableStyleId>{1E68A25C-9F12-46D8-9D1D-CAC4451E01DE}</a:tableStyleId>
               </a:tblPr>
               <a:tblGrid>
                 <a:gridCol w="3518400"/>
@@ -5311,7 +5311,7 @@
             <a:tbl>
               <a:tblPr>
                 <a:noFill/>
-                <a:tableStyleId>{60138C3E-CD7E-4B6B-B1A5-F130F15C237A}</a:tableStyleId>
+                <a:tableStyleId>{1E68A25C-9F12-46D8-9D1D-CAC4451E01DE}</a:tableStyleId>
               </a:tblPr>
               <a:tblGrid>
                 <a:gridCol w="3611800"/>
@@ -5479,7 +5479,7 @@
                             <a:srgbClr val="FFFFFF"/>
                           </a:highlight>
                         </a:rPr>
-                        <a:t>0.991</a:t>
+                        <a:t>0.906</a:t>
                       </a:r>
                     </a:p>
                   </a:txBody>
@@ -5635,7 +5635,7 @@
                       </a:pPr>
                       <a:r>
                         <a:rPr lang="en" sz="1800"/>
-                        <a:t>0.912</a:t>
+                        <a:t>0.01</a:t>
                       </a:r>
                     </a:p>
                   </a:txBody>
@@ -5714,7 +5714,7 @@
                             <a:srgbClr val="FFFFFF"/>
                           </a:highlight>
                         </a:rPr>
-                        <a:t>0.991</a:t>
+                        <a:t>0.913</a:t>
                       </a:r>
                     </a:p>
                   </a:txBody>
@@ -5785,7 +5785,7 @@
         </p:nvSpPr>
         <p:spPr>
           <a:xfrm>
-            <a:off x="7483825" y="2027200"/>
+            <a:off x="7460775" y="3880125"/>
             <a:ext cx="1185900" cy="825600"/>
           </a:xfrm>
           <a:prstGeom prst="wave">
@@ -5808,6 +5808,53 @@
           <a:lstStyle/>
           <a:p>
             <a:pPr lvl="0" algn="ctr">
+              <a:spcBef>
+                <a:spcPts val="0"/>
+              </a:spcBef>
+              <a:buNone/>
+            </a:pPr>
+            <a:r>
+              <a:rPr b="1" lang="en"/>
+              <a:t>Winner</a:t>
+            </a:r>
+            <a:r>
+              <a:rPr lang="en"/>
+              <a:t>!</a:t>
+            </a:r>
+          </a:p>
+        </p:txBody>
+      </p:sp>
+      <p:sp>
+        <p:nvSpPr>
+          <p:cNvPr id="78" name="Shape 78"/>
+          <p:cNvSpPr/>
+          <p:nvPr/>
+        </p:nvSpPr>
+        <p:spPr>
+          <a:xfrm>
+            <a:off x="7460775" y="2158950"/>
+            <a:ext cx="1185900" cy="825600"/>
+          </a:xfrm>
+          <a:prstGeom prst="wave">
+            <a:avLst>
+              <a:gd fmla="val 12500" name="adj1"/>
+              <a:gd fmla="val 0" name="adj2"/>
+            </a:avLst>
+          </a:prstGeom>
+          <a:solidFill>
+            <a:schemeClr val="accent3"/>
+          </a:solidFill>
+          <a:ln>
+            <a:noFill/>
+          </a:ln>
+        </p:spPr>
+        <p:txBody>
+          <a:bodyPr anchorCtr="0" anchor="ctr" bIns="91425" lIns="91425" rIns="91425" tIns="91425">
+            <a:noAutofit/>
+          </a:bodyPr>
+          <a:lstStyle/>
+          <a:p>
+            <a:pPr lvl="0" rtl="0" algn="ctr">
               <a:spcBef>
                 <a:spcPts val="0"/>
               </a:spcBef>
@@ -5840,7 +5887,7 @@
   <p:cSld>
     <p:spTree>
       <p:nvGrpSpPr>
-        <p:cNvPr id="81" name="Shape 81"/>
+        <p:cNvPr id="82" name="Shape 82"/>
         <p:cNvGrpSpPr/>
         <p:nvPr/>
       </p:nvGrpSpPr>
@@ -5854,7 +5901,7 @@
       </p:grpSpPr>
       <p:sp>
         <p:nvSpPr>
-          <p:cNvPr id="82" name="Shape 82"/>
+          <p:cNvPr id="83" name="Shape 83"/>
           <p:cNvSpPr txBox="1"/>
           <p:nvPr>
             <p:ph type="title"/>
@@ -5890,7 +5937,7 @@
       </p:sp>
       <p:graphicFrame>
         <p:nvGraphicFramePr>
-          <p:cNvPr id="83" name="Shape 83"/>
+          <p:cNvPr id="84" name="Shape 84"/>
           <p:cNvGraphicFramePr/>
           <p:nvPr/>
         </p:nvGraphicFramePr>
@@ -5903,7 +5950,7 @@
             <a:tbl>
               <a:tblPr>
                 <a:noFill/>
-                <a:tableStyleId>{60138C3E-CD7E-4B6B-B1A5-F130F15C237A}</a:tableStyleId>
+                <a:tableStyleId>{1E68A25C-9F12-46D8-9D1D-CAC4451E01DE}</a:tableStyleId>
               </a:tblPr>
               <a:tblGrid>
                 <a:gridCol w="1973800"/>
@@ -6012,7 +6059,7 @@
                       </a:pPr>
                       <a:r>
                         <a:rPr lang="en" sz="2400"/>
-                        <a:t>2600</a:t>
+                        <a:t>230</a:t>
                       </a:r>
                     </a:p>
                   </a:txBody>
@@ -6033,7 +6080,7 @@
                       </a:pPr>
                       <a:r>
                         <a:rPr lang="en" sz="2400"/>
-                        <a:t>14</a:t>
+                        <a:t>24</a:t>
                       </a:r>
                     </a:p>
                   </a:txBody>
@@ -6077,7 +6124,7 @@
                       </a:pPr>
                       <a:r>
                         <a:rPr lang="en" sz="2400"/>
-                        <a:t>24</a:t>
+                        <a:t>14</a:t>
                       </a:r>
                     </a:p>
                   </a:txBody>
@@ -6098,7 +6145,7 @@
                       </a:pPr>
                       <a:r>
                         <a:rPr lang="en" sz="2400"/>
-                        <a:t>230</a:t>
+                        <a:t>2600</a:t>
                       </a:r>
                     </a:p>
                   </a:txBody>
@@ -6111,7 +6158,7 @@
       </p:graphicFrame>
       <p:sp>
         <p:nvSpPr>
-          <p:cNvPr id="84" name="Shape 84"/>
+          <p:cNvPr id="85" name="Shape 85"/>
           <p:cNvSpPr txBox="1"/>
           <p:nvPr/>
         </p:nvSpPr>
@@ -6155,7 +6202,7 @@
       </p:sp>
       <p:sp>
         <p:nvSpPr>
-          <p:cNvPr id="85" name="Shape 85"/>
+          <p:cNvPr id="86" name="Shape 86"/>
           <p:cNvSpPr txBox="1"/>
           <p:nvPr/>
         </p:nvSpPr>
@@ -6213,7 +6260,7 @@
   <p:cSld>
     <p:spTree>
       <p:nvGrpSpPr>
-        <p:cNvPr id="89" name="Shape 89"/>
+        <p:cNvPr id="90" name="Shape 90"/>
         <p:cNvGrpSpPr/>
         <p:nvPr/>
       </p:nvGrpSpPr>
@@ -6227,7 +6274,7 @@
       </p:grpSpPr>
       <p:sp>
         <p:nvSpPr>
-          <p:cNvPr id="90" name="Shape 90"/>
+          <p:cNvPr id="91" name="Shape 91"/>
           <p:cNvSpPr txBox="1"/>
           <p:nvPr>
             <p:ph type="title"/>
@@ -6263,7 +6310,7 @@
       </p:sp>
       <p:sp>
         <p:nvSpPr>
-          <p:cNvPr id="91" name="Shape 91"/>
+          <p:cNvPr id="92" name="Shape 92"/>
           <p:cNvSpPr txBox="1"/>
           <p:nvPr>
             <p:ph idx="1" type="body"/>
@@ -6314,6 +6361,285 @@
 </file>
 
 <file path=ppt/theme/theme1.xml><?xml version="1.0" encoding="utf-8"?>
+<a:theme xmlns:a="http://schemas.openxmlformats.org/drawingml/2006/main" xmlns:r="http://schemas.openxmlformats.org/officeDocument/2006/relationships" name="Custom Theme">
+  <a:themeElements>
+    <a:clrScheme name="Default">
+      <a:dk1>
+        <a:srgbClr val="000000"/>
+      </a:dk1>
+      <a:lt1>
+        <a:srgbClr val="FFFFFF"/>
+      </a:lt1>
+      <a:dk2>
+        <a:srgbClr val="158158"/>
+      </a:dk2>
+      <a:lt2>
+        <a:srgbClr val="F3F3F3"/>
+      </a:lt2>
+      <a:accent1>
+        <a:srgbClr val="058DC7"/>
+      </a:accent1>
+      <a:accent2>
+        <a:srgbClr val="50B432"/>
+      </a:accent2>
+      <a:accent3>
+        <a:srgbClr val="ED561B"/>
+      </a:accent3>
+      <a:accent4>
+        <a:srgbClr val="EDEF00"/>
+      </a:accent4>
+      <a:accent5>
+        <a:srgbClr val="24CBE5"/>
+      </a:accent5>
+      <a:accent6>
+        <a:srgbClr val="64E572"/>
+      </a:accent6>
+      <a:hlink>
+        <a:srgbClr val="2200CC"/>
+      </a:hlink>
+      <a:folHlink>
+        <a:srgbClr val="551A8B"/>
+      </a:folHlink>
+    </a:clrScheme>
+    <a:fontScheme name="Office">
+      <a:majorFont>
+        <a:latin typeface="Arial"/>
+        <a:ea typeface=""/>
+        <a:cs typeface=""/>
+        <a:font script="Jpan" typeface="ＭＳ Ｐゴシック"/>
+        <a:font script="Hang" typeface="맑은 고딕"/>
+        <a:font script="Hans" typeface="宋体"/>
+        <a:font script="Hant" typeface="新細明體"/>
+        <a:font script="Arab" typeface="Times New Roman"/>
+        <a:font script="Hebr" typeface="Times New Roman"/>
+        <a:font script="Thai" typeface="Angsana New"/>
+        <a:font script="Ethi" typeface="Nyala"/>
+        <a:font script="Beng" typeface="Vrinda"/>
+        <a:font script="Gujr" typeface="Shruti"/>
+        <a:font script="Khmr" typeface="MoolBoran"/>
+        <a:font script="Knda" typeface="Tunga"/>
+        <a:font script="Guru" typeface="Raavi"/>
+        <a:font script="Cans" typeface="Euphemia"/>
+        <a:font script="Cher" typeface="Plantagenet Cherokee"/>
+        <a:font script="Yiii" typeface="Microsoft Yi Baiti"/>
+        <a:font script="Tibt" typeface="Microsoft Himalaya"/>
+        <a:font script="Thaa" typeface="MV Boli"/>
+        <a:font script="Deva" typeface="Mangal"/>
+        <a:font script="Telu" typeface="Gautami"/>
+        <a:font script="Taml" typeface="Latha"/>
+        <a:font script="Syrc" typeface="Estrangelo Edessa"/>
+        <a:font script="Orya" typeface="Kalinga"/>
+        <a:font script="Mlym" typeface="Kartika"/>
+        <a:font script="Laoo" typeface="DokChampa"/>
+        <a:font script="Sinh" typeface="Iskoola Pota"/>
+        <a:font script="Mong" typeface="Mongolian Baiti"/>
+        <a:font script="Viet" typeface="Times New Roman"/>
+        <a:font script="Uigh" typeface="Microsoft Uighur"/>
+        <a:font script="Geor" typeface="Sylfaen"/>
+      </a:majorFont>
+      <a:minorFont>
+        <a:latin typeface="Arial"/>
+        <a:ea typeface=""/>
+        <a:cs typeface=""/>
+        <a:font script="Jpan" typeface="ＭＳ Ｐゴシック"/>
+        <a:font script="Hang" typeface="맑은 고딕"/>
+        <a:font script="Hans" typeface="宋体"/>
+        <a:font script="Hant" typeface="新細明體"/>
+        <a:font script="Arab" typeface="Arial"/>
+        <a:font script="Hebr" typeface="Arial"/>
+        <a:font script="Thai" typeface="Cordia New"/>
+        <a:font script="Ethi" typeface="Nyala"/>
+        <a:font script="Beng" typeface="Vrinda"/>
+        <a:font script="Gujr" typeface="Shruti"/>
+        <a:font script="Khmr" typeface="DaunPenh"/>
+        <a:font script="Knda" typeface="Tunga"/>
+        <a:font script="Guru" typeface="Raavi"/>
+        <a:font script="Cans" typeface="Euphemia"/>
+        <a:font script="Cher" typeface="Plantagenet Cherokee"/>
+        <a:font script="Yiii" typeface="Microsoft Yi Baiti"/>
+        <a:font script="Tibt" typeface="Microsoft Himalaya"/>
+        <a:font script="Thaa" typeface="MV Boli"/>
+        <a:font script="Deva" typeface="Mangal"/>
+        <a:font script="Telu" typeface="Gautami"/>
+        <a:font script="Taml" typeface="Latha"/>
+        <a:font script="Syrc" typeface="Estrangelo Edessa"/>
+        <a:font script="Orya" typeface="Kalinga"/>
+        <a:font script="Mlym" typeface="Kartika"/>
+        <a:font script="Laoo" typeface="DokChampa"/>
+        <a:font script="Sinh" typeface="Iskoola Pota"/>
+        <a:font script="Mong" typeface="Mongolian Baiti"/>
+        <a:font script="Viet" typeface="Arial"/>
+        <a:font script="Uigh" typeface="Microsoft Uighur"/>
+        <a:font script="Geor" typeface="Sylfaen"/>
+      </a:minorFont>
+    </a:fontScheme>
+    <a:fmtScheme name="Office">
+      <a:fillStyleLst>
+        <a:solidFill>
+          <a:schemeClr val="phClr"/>
+        </a:solidFill>
+        <a:gradFill rotWithShape="1">
+          <a:gsLst>
+            <a:gs pos="0">
+              <a:schemeClr val="phClr">
+                <a:tint val="50000"/>
+                <a:satMod val="300000"/>
+              </a:schemeClr>
+            </a:gs>
+            <a:gs pos="35000">
+              <a:schemeClr val="phClr">
+                <a:tint val="37000"/>
+                <a:satMod val="300000"/>
+              </a:schemeClr>
+            </a:gs>
+            <a:gs pos="100000">
+              <a:schemeClr val="phClr">
+                <a:tint val="15000"/>
+                <a:satMod val="350000"/>
+              </a:schemeClr>
+            </a:gs>
+          </a:gsLst>
+          <a:lin ang="16200000" scaled="1"/>
+        </a:gradFill>
+        <a:gradFill rotWithShape="1">
+          <a:gsLst>
+            <a:gs pos="0">
+              <a:schemeClr val="phClr">
+                <a:tint val="100000"/>
+                <a:shade val="100000"/>
+                <a:satMod val="130000"/>
+              </a:schemeClr>
+            </a:gs>
+            <a:gs pos="100000">
+              <a:schemeClr val="phClr">
+                <a:tint val="50000"/>
+                <a:shade val="100000"/>
+                <a:satMod val="350000"/>
+              </a:schemeClr>
+            </a:gs>
+          </a:gsLst>
+          <a:lin ang="16200000" scaled="0"/>
+        </a:gradFill>
+      </a:fillStyleLst>
+      <a:lnStyleLst>
+        <a:ln w="9525" cap="flat" cmpd="sng" algn="ctr">
+          <a:solidFill>
+            <a:schemeClr val="phClr">
+              <a:shade val="95000"/>
+              <a:satMod val="105000"/>
+            </a:schemeClr>
+          </a:solidFill>
+          <a:prstDash val="solid"/>
+        </a:ln>
+        <a:ln w="25400" cap="flat" cmpd="sng" algn="ctr">
+          <a:solidFill>
+            <a:schemeClr val="phClr"/>
+          </a:solidFill>
+          <a:prstDash val="solid"/>
+        </a:ln>
+        <a:ln w="38100" cap="flat" cmpd="sng" algn="ctr">
+          <a:solidFill>
+            <a:schemeClr val="phClr"/>
+          </a:solidFill>
+          <a:prstDash val="solid"/>
+        </a:ln>
+      </a:lnStyleLst>
+      <a:effectStyleLst>
+        <a:effectStyle>
+          <a:effectLst>
+            <a:outerShdw blurRad="40000" dist="20000" dir="5400000" rotWithShape="0">
+              <a:srgbClr val="000000">
+                <a:alpha val="38000"/>
+              </a:srgbClr>
+            </a:outerShdw>
+          </a:effectLst>
+        </a:effectStyle>
+        <a:effectStyle>
+          <a:effectLst>
+            <a:outerShdw blurRad="40000" dist="23000" dir="5400000" rotWithShape="0">
+              <a:srgbClr val="000000">
+                <a:alpha val="35000"/>
+              </a:srgbClr>
+            </a:outerShdw>
+          </a:effectLst>
+        </a:effectStyle>
+        <a:effectStyle>
+          <a:effectLst>
+            <a:outerShdw blurRad="40000" dist="23000" dir="5400000" rotWithShape="0">
+              <a:srgbClr val="000000">
+                <a:alpha val="35000"/>
+              </a:srgbClr>
+            </a:outerShdw>
+          </a:effectLst>
+          <a:scene3d>
+            <a:camera prst="orthographicFront">
+              <a:rot lat="0" lon="0" rev="0"/>
+            </a:camera>
+            <a:lightRig rig="threePt" dir="t">
+              <a:rot lat="0" lon="0" rev="1200000"/>
+            </a:lightRig>
+          </a:scene3d>
+          <a:sp3d>
+            <a:bevelT w="63500" h="25400"/>
+          </a:sp3d>
+        </a:effectStyle>
+      </a:effectStyleLst>
+      <a:bgFillStyleLst>
+        <a:solidFill>
+          <a:schemeClr val="phClr"/>
+        </a:solidFill>
+        <a:gradFill rotWithShape="1">
+          <a:gsLst>
+            <a:gs pos="0">
+              <a:schemeClr val="phClr">
+                <a:tint val="40000"/>
+                <a:satMod val="350000"/>
+              </a:schemeClr>
+            </a:gs>
+            <a:gs pos="40000">
+              <a:schemeClr val="phClr">
+                <a:tint val="45000"/>
+                <a:shade val="99000"/>
+                <a:satMod val="350000"/>
+              </a:schemeClr>
+            </a:gs>
+            <a:gs pos="100000">
+              <a:schemeClr val="phClr">
+                <a:shade val="20000"/>
+                <a:satMod val="255000"/>
+              </a:schemeClr>
+            </a:gs>
+          </a:gsLst>
+          <a:path path="circle">
+            <a:fillToRect l="50000" t="-80000" r="50000" b="180000"/>
+          </a:path>
+        </a:gradFill>
+        <a:gradFill rotWithShape="1">
+          <a:gsLst>
+            <a:gs pos="0">
+              <a:schemeClr val="phClr">
+                <a:tint val="80000"/>
+                <a:satMod val="300000"/>
+              </a:schemeClr>
+            </a:gs>
+            <a:gs pos="100000">
+              <a:schemeClr val="phClr">
+                <a:shade val="30000"/>
+                <a:satMod val="200000"/>
+              </a:schemeClr>
+            </a:gs>
+          </a:gsLst>
+          <a:path path="circle">
+            <a:fillToRect l="50000" t="50000" r="50000" b="50000"/>
+          </a:path>
+        </a:gradFill>
+      </a:bgFillStyleLst>
+    </a:fmtScheme>
+  </a:themeElements>
+</a:theme>
+</file>
+
+<file path=ppt/theme/theme2.xml><?xml version="1.0" encoding="utf-8"?>
 <a:theme xmlns:a="http://schemas.openxmlformats.org/drawingml/2006/main" xmlns:r="http://schemas.openxmlformats.org/officeDocument/2006/relationships" name="gameday">
   <a:themeElements>
     <a:clrScheme name="Gameday">
@@ -6590,283 +6916,4 @@
     </a:fmtScheme>
   </a:themeElements>
 </a:theme>
-</file>
-
-<file path=ppt/theme/theme2.xml><?xml version="1.0" encoding="utf-8"?>
-<a:theme xmlns:a="http://schemas.openxmlformats.org/drawingml/2006/main" xmlns:r="http://schemas.openxmlformats.org/officeDocument/2006/relationships" name="Custom Theme">
-  <a:themeElements>
-    <a:clrScheme name="Default">
-      <a:dk1>
-        <a:srgbClr val="000000"/>
-      </a:dk1>
-      <a:lt1>
-        <a:srgbClr val="FFFFFF"/>
-      </a:lt1>
-      <a:dk2>
-        <a:srgbClr val="158158"/>
-      </a:dk2>
-      <a:lt2>
-        <a:srgbClr val="F3F3F3"/>
-      </a:lt2>
-      <a:accent1>
-        <a:srgbClr val="058DC7"/>
-      </a:accent1>
-      <a:accent2>
-        <a:srgbClr val="50B432"/>
-      </a:accent2>
-      <a:accent3>
-        <a:srgbClr val="ED561B"/>
-      </a:accent3>
-      <a:accent4>
-        <a:srgbClr val="EDEF00"/>
-      </a:accent4>
-      <a:accent5>
-        <a:srgbClr val="24CBE5"/>
-      </a:accent5>
-      <a:accent6>
-        <a:srgbClr val="64E572"/>
-      </a:accent6>
-      <a:hlink>
-        <a:srgbClr val="2200CC"/>
-      </a:hlink>
-      <a:folHlink>
-        <a:srgbClr val="551A8B"/>
-      </a:folHlink>
-    </a:clrScheme>
-    <a:fontScheme name="Office">
-      <a:majorFont>
-        <a:latin typeface="Arial"/>
-        <a:ea typeface=""/>
-        <a:cs typeface=""/>
-        <a:font script="Jpan" typeface="ＭＳ Ｐゴシック"/>
-        <a:font script="Hang" typeface="맑은 고딕"/>
-        <a:font script="Hans" typeface="宋体"/>
-        <a:font script="Hant" typeface="新細明體"/>
-        <a:font script="Arab" typeface="Times New Roman"/>
-        <a:font script="Hebr" typeface="Times New Roman"/>
-        <a:font script="Thai" typeface="Angsana New"/>
-        <a:font script="Ethi" typeface="Nyala"/>
-        <a:font script="Beng" typeface="Vrinda"/>
-        <a:font script="Gujr" typeface="Shruti"/>
-        <a:font script="Khmr" typeface="MoolBoran"/>
-        <a:font script="Knda" typeface="Tunga"/>
-        <a:font script="Guru" typeface="Raavi"/>
-        <a:font script="Cans" typeface="Euphemia"/>
-        <a:font script="Cher" typeface="Plantagenet Cherokee"/>
-        <a:font script="Yiii" typeface="Microsoft Yi Baiti"/>
-        <a:font script="Tibt" typeface="Microsoft Himalaya"/>
-        <a:font script="Thaa" typeface="MV Boli"/>
-        <a:font script="Deva" typeface="Mangal"/>
-        <a:font script="Telu" typeface="Gautami"/>
-        <a:font script="Taml" typeface="Latha"/>
-        <a:font script="Syrc" typeface="Estrangelo Edessa"/>
-        <a:font script="Orya" typeface="Kalinga"/>
-        <a:font script="Mlym" typeface="Kartika"/>
-        <a:font script="Laoo" typeface="DokChampa"/>
-        <a:font script="Sinh" typeface="Iskoola Pota"/>
-        <a:font script="Mong" typeface="Mongolian Baiti"/>
-        <a:font script="Viet" typeface="Times New Roman"/>
-        <a:font script="Uigh" typeface="Microsoft Uighur"/>
-        <a:font script="Geor" typeface="Sylfaen"/>
-      </a:majorFont>
-      <a:minorFont>
-        <a:latin typeface="Arial"/>
-        <a:ea typeface=""/>
-        <a:cs typeface=""/>
-        <a:font script="Jpan" typeface="ＭＳ Ｐゴシック"/>
-        <a:font script="Hang" typeface="맑은 고딕"/>
-        <a:font script="Hans" typeface="宋体"/>
-        <a:font script="Hant" typeface="新細明體"/>
-        <a:font script="Arab" typeface="Arial"/>
-        <a:font script="Hebr" typeface="Arial"/>
-        <a:font script="Thai" typeface="Cordia New"/>
-        <a:font script="Ethi" typeface="Nyala"/>
-        <a:font script="Beng" typeface="Vrinda"/>
-        <a:font script="Gujr" typeface="Shruti"/>
-        <a:font script="Khmr" typeface="DaunPenh"/>
-        <a:font script="Knda" typeface="Tunga"/>
-        <a:font script="Guru" typeface="Raavi"/>
-        <a:font script="Cans" typeface="Euphemia"/>
-        <a:font script="Cher" typeface="Plantagenet Cherokee"/>
-        <a:font script="Yiii" typeface="Microsoft Yi Baiti"/>
-        <a:font script="Tibt" typeface="Microsoft Himalaya"/>
-        <a:font script="Thaa" typeface="MV Boli"/>
-        <a:font script="Deva" typeface="Mangal"/>
-        <a:font script="Telu" typeface="Gautami"/>
-        <a:font script="Taml" typeface="Latha"/>
-        <a:font script="Syrc" typeface="Estrangelo Edessa"/>
-        <a:font script="Orya" typeface="Kalinga"/>
-        <a:font script="Mlym" typeface="Kartika"/>
-        <a:font script="Laoo" typeface="DokChampa"/>
-        <a:font script="Sinh" typeface="Iskoola Pota"/>
-        <a:font script="Mong" typeface="Mongolian Baiti"/>
-        <a:font script="Viet" typeface="Arial"/>
-        <a:font script="Uigh" typeface="Microsoft Uighur"/>
-        <a:font script="Geor" typeface="Sylfaen"/>
-      </a:minorFont>
-    </a:fontScheme>
-    <a:fmtScheme name="Office">
-      <a:fillStyleLst>
-        <a:solidFill>
-          <a:schemeClr val="phClr"/>
-        </a:solidFill>
-        <a:gradFill rotWithShape="1">
-          <a:gsLst>
-            <a:gs pos="0">
-              <a:schemeClr val="phClr">
-                <a:tint val="50000"/>
-                <a:satMod val="300000"/>
-              </a:schemeClr>
-            </a:gs>
-            <a:gs pos="35000">
-              <a:schemeClr val="phClr">
-                <a:tint val="37000"/>
-                <a:satMod val="300000"/>
-              </a:schemeClr>
-            </a:gs>
-            <a:gs pos="100000">
-              <a:schemeClr val="phClr">
-                <a:tint val="15000"/>
-                <a:satMod val="350000"/>
-              </a:schemeClr>
-            </a:gs>
-          </a:gsLst>
-          <a:lin ang="16200000" scaled="1"/>
-        </a:gradFill>
-        <a:gradFill rotWithShape="1">
-          <a:gsLst>
-            <a:gs pos="0">
-              <a:schemeClr val="phClr">
-                <a:tint val="100000"/>
-                <a:shade val="100000"/>
-                <a:satMod val="130000"/>
-              </a:schemeClr>
-            </a:gs>
-            <a:gs pos="100000">
-              <a:schemeClr val="phClr">
-                <a:tint val="50000"/>
-                <a:shade val="100000"/>
-                <a:satMod val="350000"/>
-              </a:schemeClr>
-            </a:gs>
-          </a:gsLst>
-          <a:lin ang="16200000" scaled="0"/>
-        </a:gradFill>
-      </a:fillStyleLst>
-      <a:lnStyleLst>
-        <a:ln w="9525" cap="flat" cmpd="sng" algn="ctr">
-          <a:solidFill>
-            <a:schemeClr val="phClr">
-              <a:shade val="95000"/>
-              <a:satMod val="105000"/>
-            </a:schemeClr>
-          </a:solidFill>
-          <a:prstDash val="solid"/>
-        </a:ln>
-        <a:ln w="25400" cap="flat" cmpd="sng" algn="ctr">
-          <a:solidFill>
-            <a:schemeClr val="phClr"/>
-          </a:solidFill>
-          <a:prstDash val="solid"/>
-        </a:ln>
-        <a:ln w="38100" cap="flat" cmpd="sng" algn="ctr">
-          <a:solidFill>
-            <a:schemeClr val="phClr"/>
-          </a:solidFill>
-          <a:prstDash val="solid"/>
-        </a:ln>
-      </a:lnStyleLst>
-      <a:effectStyleLst>
-        <a:effectStyle>
-          <a:effectLst>
-            <a:outerShdw blurRad="40000" dist="20000" dir="5400000" rotWithShape="0">
-              <a:srgbClr val="000000">
-                <a:alpha val="38000"/>
-              </a:srgbClr>
-            </a:outerShdw>
-          </a:effectLst>
-        </a:effectStyle>
-        <a:effectStyle>
-          <a:effectLst>
-            <a:outerShdw blurRad="40000" dist="23000" dir="5400000" rotWithShape="0">
-              <a:srgbClr val="000000">
-                <a:alpha val="35000"/>
-              </a:srgbClr>
-            </a:outerShdw>
-          </a:effectLst>
-        </a:effectStyle>
-        <a:effectStyle>
-          <a:effectLst>
-            <a:outerShdw blurRad="40000" dist="23000" dir="5400000" rotWithShape="0">
-              <a:srgbClr val="000000">
-                <a:alpha val="35000"/>
-              </a:srgbClr>
-            </a:outerShdw>
-          </a:effectLst>
-          <a:scene3d>
-            <a:camera prst="orthographicFront">
-              <a:rot lat="0" lon="0" rev="0"/>
-            </a:camera>
-            <a:lightRig rig="threePt" dir="t">
-              <a:rot lat="0" lon="0" rev="1200000"/>
-            </a:lightRig>
-          </a:scene3d>
-          <a:sp3d>
-            <a:bevelT w="63500" h="25400"/>
-          </a:sp3d>
-        </a:effectStyle>
-      </a:effectStyleLst>
-      <a:bgFillStyleLst>
-        <a:solidFill>
-          <a:schemeClr val="phClr"/>
-        </a:solidFill>
-        <a:gradFill rotWithShape="1">
-          <a:gsLst>
-            <a:gs pos="0">
-              <a:schemeClr val="phClr">
-                <a:tint val="40000"/>
-                <a:satMod val="350000"/>
-              </a:schemeClr>
-            </a:gs>
-            <a:gs pos="40000">
-              <a:schemeClr val="phClr">
-                <a:tint val="45000"/>
-                <a:shade val="99000"/>
-                <a:satMod val="350000"/>
-              </a:schemeClr>
-            </a:gs>
-            <a:gs pos="100000">
-              <a:schemeClr val="phClr">
-                <a:shade val="20000"/>
-                <a:satMod val="255000"/>
-              </a:schemeClr>
-            </a:gs>
-          </a:gsLst>
-          <a:path path="circle">
-            <a:fillToRect l="50000" t="-80000" r="50000" b="180000"/>
-          </a:path>
-        </a:gradFill>
-        <a:gradFill rotWithShape="1">
-          <a:gsLst>
-            <a:gs pos="0">
-              <a:schemeClr val="phClr">
-                <a:tint val="80000"/>
-                <a:satMod val="300000"/>
-              </a:schemeClr>
-            </a:gs>
-            <a:gs pos="100000">
-              <a:schemeClr val="phClr">
-                <a:shade val="30000"/>
-                <a:satMod val="200000"/>
-              </a:schemeClr>
-            </a:gs>
-          </a:gsLst>
-          <a:path path="circle">
-            <a:fillToRect l="50000" t="50000" r="50000" b="50000"/>
-          </a:path>
-        </a:gradFill>
-      </a:bgFillStyleLst>
-    </a:fmtScheme>
-  </a:themeElements>
-</a:theme>
 </file>
</xml_diff>

<commit_message>
Susie & Kevin final pp/app
</commit_message>
<xml_diff>
--- a/Fraud_Detection.pptx
+++ b/Fraud_Detection.pptx
@@ -608,7 +608,7 @@
   <p:cSld>
     <p:spTree>
       <p:nvGrpSpPr>
-        <p:cNvPr id="64" name="Shape 64"/>
+        <p:cNvPr id="66" name="Shape 66"/>
         <p:cNvGrpSpPr/>
         <p:nvPr/>
       </p:nvGrpSpPr>
@@ -622,7 +622,7 @@
       </p:grpSpPr>
       <p:sp>
         <p:nvSpPr>
-          <p:cNvPr id="65" name="Shape 65"/>
+          <p:cNvPr id="67" name="Shape 67"/>
           <p:cNvSpPr/>
           <p:nvPr>
             <p:ph idx="2" type="sldImg"/>
@@ -666,7 +666,7 @@
       </p:sp>
       <p:sp>
         <p:nvSpPr>
-          <p:cNvPr id="66" name="Shape 66"/>
+          <p:cNvPr id="68" name="Shape 68"/>
           <p:cNvSpPr txBox="1"/>
           <p:nvPr>
             <p:ph idx="1" type="body"/>
@@ -713,7 +713,7 @@
   <p:cSld>
     <p:spTree>
       <p:nvGrpSpPr>
-        <p:cNvPr id="70" name="Shape 70"/>
+        <p:cNvPr id="72" name="Shape 72"/>
         <p:cNvGrpSpPr/>
         <p:nvPr/>
       </p:nvGrpSpPr>
@@ -727,7 +727,7 @@
       </p:grpSpPr>
       <p:sp>
         <p:nvSpPr>
-          <p:cNvPr id="71" name="Shape 71"/>
+          <p:cNvPr id="73" name="Shape 73"/>
           <p:cNvSpPr/>
           <p:nvPr>
             <p:ph idx="2" type="sldImg"/>
@@ -771,7 +771,7 @@
       </p:sp>
       <p:sp>
         <p:nvSpPr>
-          <p:cNvPr id="72" name="Shape 72"/>
+          <p:cNvPr id="74" name="Shape 74"/>
           <p:cNvSpPr txBox="1"/>
           <p:nvPr>
             <p:ph idx="1" type="body"/>
@@ -818,7 +818,7 @@
   <p:cSld>
     <p:spTree>
       <p:nvGrpSpPr>
-        <p:cNvPr id="79" name="Shape 79"/>
+        <p:cNvPr id="81" name="Shape 81"/>
         <p:cNvGrpSpPr/>
         <p:nvPr/>
       </p:nvGrpSpPr>
@@ -832,7 +832,7 @@
       </p:grpSpPr>
       <p:sp>
         <p:nvSpPr>
-          <p:cNvPr id="80" name="Shape 80"/>
+          <p:cNvPr id="82" name="Shape 82"/>
           <p:cNvSpPr/>
           <p:nvPr>
             <p:ph idx="2" type="sldImg"/>
@@ -876,7 +876,7 @@
       </p:sp>
       <p:sp>
         <p:nvSpPr>
-          <p:cNvPr id="81" name="Shape 81"/>
+          <p:cNvPr id="83" name="Shape 83"/>
           <p:cNvSpPr txBox="1"/>
           <p:nvPr>
             <p:ph idx="1" type="body"/>
@@ -923,7 +923,7 @@
   <p:cSld>
     <p:spTree>
       <p:nvGrpSpPr>
-        <p:cNvPr id="87" name="Shape 87"/>
+        <p:cNvPr id="89" name="Shape 89"/>
         <p:cNvGrpSpPr/>
         <p:nvPr/>
       </p:nvGrpSpPr>
@@ -937,7 +937,7 @@
       </p:grpSpPr>
       <p:sp>
         <p:nvSpPr>
-          <p:cNvPr id="88" name="Shape 88"/>
+          <p:cNvPr id="90" name="Shape 90"/>
           <p:cNvSpPr/>
           <p:nvPr>
             <p:ph idx="2" type="sldImg"/>
@@ -981,7 +981,7 @@
       </p:sp>
       <p:sp>
         <p:nvSpPr>
-          <p:cNvPr id="89" name="Shape 89"/>
+          <p:cNvPr id="91" name="Shape 91"/>
           <p:cNvSpPr txBox="1"/>
           <p:nvPr>
             <p:ph idx="1" type="body"/>
@@ -4827,7 +4827,7 @@
           <p:nvPr/>
         </p:nvGraphicFramePr>
         <p:xfrm>
-          <a:off x="311700" y="1169375"/>
+          <a:off x="1001375" y="1169375"/>
           <a:ext cx="3000000" cy="3000000"/>
         </p:xfrm>
         <a:graphic>
@@ -4835,11 +4835,11 @@
             <a:tbl>
               <a:tblPr>
                 <a:noFill/>
-                <a:tableStyleId>{1E68A25C-9F12-46D8-9D1D-CAC4451E01DE}</a:tableStyleId>
+                <a:tableStyleId>{83B64262-6560-4240-9E96-8B0D0E935F6A}</a:tableStyleId>
               </a:tblPr>
               <a:tblGrid>
-                <a:gridCol w="3518400"/>
-                <a:gridCol w="4695400"/>
+                <a:gridCol w="3596800"/>
+                <a:gridCol w="3927325"/>
               </a:tblGrid>
               <a:tr h="399075">
                 <a:tc>
@@ -4909,7 +4909,7 @@
                     </a:bodyPr>
                     <a:lstStyle/>
                     <a:p>
-                      <a:pPr lvl="0">
+                      <a:pPr lvl="0" algn="ctr">
                         <a:spcBef>
                           <a:spcPts val="0"/>
                         </a:spcBef>
@@ -4965,7 +4965,7 @@
                     </a:bodyPr>
                     <a:lstStyle/>
                     <a:p>
-                      <a:pPr lvl="0" rtl="0">
+                      <a:pPr lvl="0" rtl="0" algn="ctr">
                         <a:spcBef>
                           <a:spcPts val="0"/>
                         </a:spcBef>
@@ -4977,11 +4977,11 @@
                       </a:r>
                     </a:p>
                     <a:p>
-                      <a:pPr indent="-228600" lvl="0" marL="457200" rtl="0">
+                      <a:pPr lvl="0" rtl="0" algn="ctr">
                         <a:spcBef>
                           <a:spcPts val="0"/>
                         </a:spcBef>
-                        <a:buChar char="●"/>
+                        <a:buNone/>
                       </a:pPr>
                       <a:r>
                         <a:rPr lang="en"/>
@@ -5021,7 +5021,7 @@
                     </a:bodyPr>
                     <a:lstStyle/>
                     <a:p>
-                      <a:pPr lvl="0">
+                      <a:pPr lvl="0" algn="ctr">
                         <a:spcBef>
                           <a:spcPts val="0"/>
                         </a:spcBef>
@@ -5050,19 +5050,7 @@
                       </a:pPr>
                       <a:r>
                         <a:rPr lang="en"/>
-                        <a:t>Payee Name should be similar to Org Name. We did a Fuzzy String similarity between these two fields. </a:t>
-                      </a:r>
-                    </a:p>
-                    <a:p>
-                      <a:pPr lvl="0" rtl="0">
-                        <a:spcBef>
-                          <a:spcPts val="0"/>
-                        </a:spcBef>
-                        <a:buNone/>
-                      </a:pPr>
-                      <a:r>
-                        <a:rPr lang="en"/>
-                        <a:t>ex. </a:t>
+                        <a:t>Payee Name ~ Org Name. Fuzzy String similarity between these two fields. </a:t>
                       </a:r>
                     </a:p>
                     <a:p>
@@ -5101,7 +5089,7 @@
                     </a:bodyPr>
                     <a:lstStyle/>
                     <a:p>
-                      <a:pPr lvl="0">
+                      <a:pPr lvl="0" algn="ctr">
                         <a:spcBef>
                           <a:spcPts val="0"/>
                         </a:spcBef>
@@ -5141,6 +5129,94 @@
           </a:graphicData>
         </a:graphic>
       </p:graphicFrame>
+      <p:sp>
+        <p:nvSpPr>
+          <p:cNvPr id="64" name="Shape 64"/>
+          <p:cNvSpPr/>
+          <p:nvPr/>
+        </p:nvSpPr>
+        <p:spPr>
+          <a:xfrm>
+            <a:off x="100825" y="2303425"/>
+            <a:ext cx="1250399" cy="663300"/>
+          </a:xfrm>
+          <a:prstGeom prst="star7">
+            <a:avLst>
+              <a:gd fmla="val 34601" name="adj"/>
+              <a:gd fmla="val 102572" name="hf"/>
+              <a:gd fmla="val 105210" name="vf"/>
+            </a:avLst>
+          </a:prstGeom>
+          <a:solidFill>
+            <a:schemeClr val="accent3"/>
+          </a:solidFill>
+          <a:ln>
+            <a:noFill/>
+          </a:ln>
+        </p:spPr>
+        <p:txBody>
+          <a:bodyPr anchorCtr="0" anchor="ctr" bIns="91425" lIns="91425" rIns="91425" tIns="91425">
+            <a:noAutofit/>
+          </a:bodyPr>
+          <a:lstStyle/>
+          <a:p>
+            <a:pPr lvl="0">
+              <a:spcBef>
+                <a:spcPts val="0"/>
+              </a:spcBef>
+              <a:buNone/>
+            </a:pPr>
+            <a:r>
+              <a:rPr lang="en"/>
+              <a:t>Useful</a:t>
+            </a:r>
+          </a:p>
+        </p:txBody>
+      </p:sp>
+      <p:sp>
+        <p:nvSpPr>
+          <p:cNvPr id="65" name="Shape 65"/>
+          <p:cNvSpPr/>
+          <p:nvPr/>
+        </p:nvSpPr>
+        <p:spPr>
+          <a:xfrm>
+            <a:off x="100825" y="1499100"/>
+            <a:ext cx="1250399" cy="663300"/>
+          </a:xfrm>
+          <a:prstGeom prst="star7">
+            <a:avLst>
+              <a:gd fmla="val 34601" name="adj"/>
+              <a:gd fmla="val 102572" name="hf"/>
+              <a:gd fmla="val 105210" name="vf"/>
+            </a:avLst>
+          </a:prstGeom>
+          <a:solidFill>
+            <a:schemeClr val="accent3"/>
+          </a:solidFill>
+          <a:ln>
+            <a:noFill/>
+          </a:ln>
+        </p:spPr>
+        <p:txBody>
+          <a:bodyPr anchorCtr="0" anchor="ctr" bIns="91425" lIns="91425" rIns="91425" tIns="91425">
+            <a:noAutofit/>
+          </a:bodyPr>
+          <a:lstStyle/>
+          <a:p>
+            <a:pPr lvl="0" rtl="0">
+              <a:spcBef>
+                <a:spcPts val="0"/>
+              </a:spcBef>
+              <a:buNone/>
+            </a:pPr>
+            <a:r>
+              <a:rPr lang="en"/>
+              <a:t>Useful</a:t>
+            </a:r>
+          </a:p>
+        </p:txBody>
+      </p:sp>
     </p:spTree>
   </p:cSld>
   <p:clrMapOvr>
@@ -5157,7 +5233,7 @@
   <p:cSld>
     <p:spTree>
       <p:nvGrpSpPr>
-        <p:cNvPr id="67" name="Shape 67"/>
+        <p:cNvPr id="69" name="Shape 69"/>
         <p:cNvGrpSpPr/>
         <p:nvPr/>
       </p:nvGrpSpPr>
@@ -5171,7 +5247,7 @@
       </p:grpSpPr>
       <p:sp>
         <p:nvSpPr>
-          <p:cNvPr id="68" name="Shape 68"/>
+          <p:cNvPr id="70" name="Shape 70"/>
           <p:cNvSpPr txBox="1"/>
           <p:nvPr>
             <p:ph type="title"/>
@@ -5207,7 +5283,7 @@
       </p:sp>
       <p:pic>
         <p:nvPicPr>
-          <p:cNvPr id="69" name="Shape 69"/>
+          <p:cNvPr id="71" name="Shape 71"/>
           <p:cNvPicPr preferRelativeResize="0"/>
           <p:nvPr/>
         </p:nvPicPr>
@@ -5248,7 +5324,7 @@
   <p:cSld>
     <p:spTree>
       <p:nvGrpSpPr>
-        <p:cNvPr id="73" name="Shape 73"/>
+        <p:cNvPr id="75" name="Shape 75"/>
         <p:cNvGrpSpPr/>
         <p:nvPr/>
       </p:nvGrpSpPr>
@@ -5262,7 +5338,7 @@
       </p:grpSpPr>
       <p:sp>
         <p:nvSpPr>
-          <p:cNvPr id="74" name="Shape 74"/>
+          <p:cNvPr id="76" name="Shape 76"/>
           <p:cNvSpPr txBox="1"/>
           <p:nvPr>
             <p:ph type="title"/>
@@ -5298,7 +5374,7 @@
       </p:sp>
       <p:graphicFrame>
         <p:nvGraphicFramePr>
-          <p:cNvPr id="75" name="Shape 75"/>
+          <p:cNvPr id="77" name="Shape 77"/>
           <p:cNvGraphicFramePr/>
           <p:nvPr/>
         </p:nvGraphicFramePr>
@@ -5311,7 +5387,7 @@
             <a:tbl>
               <a:tblPr>
                 <a:noFill/>
-                <a:tableStyleId>{1E68A25C-9F12-46D8-9D1D-CAC4451E01DE}</a:tableStyleId>
+                <a:tableStyleId>{83B64262-6560-4240-9E96-8B0D0E935F6A}</a:tableStyleId>
               </a:tblPr>
               <a:tblGrid>
                 <a:gridCol w="3611800"/>
@@ -5727,7 +5803,7 @@
       </p:graphicFrame>
       <p:sp>
         <p:nvSpPr>
-          <p:cNvPr id="76" name="Shape 76"/>
+          <p:cNvPr id="78" name="Shape 78"/>
           <p:cNvSpPr txBox="1"/>
           <p:nvPr/>
         </p:nvSpPr>
@@ -5779,7 +5855,7 @@
       </p:sp>
       <p:sp>
         <p:nvSpPr>
-          <p:cNvPr id="77" name="Shape 77"/>
+          <p:cNvPr id="79" name="Shape 79"/>
           <p:cNvSpPr/>
           <p:nvPr/>
         </p:nvSpPr>
@@ -5826,7 +5902,7 @@
       </p:sp>
       <p:sp>
         <p:nvSpPr>
-          <p:cNvPr id="78" name="Shape 78"/>
+          <p:cNvPr id="80" name="Shape 80"/>
           <p:cNvSpPr/>
           <p:nvPr/>
         </p:nvSpPr>
@@ -5887,7 +5963,7 @@
   <p:cSld>
     <p:spTree>
       <p:nvGrpSpPr>
-        <p:cNvPr id="82" name="Shape 82"/>
+        <p:cNvPr id="84" name="Shape 84"/>
         <p:cNvGrpSpPr/>
         <p:nvPr/>
       </p:nvGrpSpPr>
@@ -5901,7 +5977,7 @@
       </p:grpSpPr>
       <p:sp>
         <p:nvSpPr>
-          <p:cNvPr id="83" name="Shape 83"/>
+          <p:cNvPr id="85" name="Shape 85"/>
           <p:cNvSpPr txBox="1"/>
           <p:nvPr>
             <p:ph type="title"/>
@@ -5937,7 +6013,7 @@
       </p:sp>
       <p:graphicFrame>
         <p:nvGraphicFramePr>
-          <p:cNvPr id="84" name="Shape 84"/>
+          <p:cNvPr id="86" name="Shape 86"/>
           <p:cNvGraphicFramePr/>
           <p:nvPr/>
         </p:nvGraphicFramePr>
@@ -5950,7 +6026,7 @@
             <a:tbl>
               <a:tblPr>
                 <a:noFill/>
-                <a:tableStyleId>{1E68A25C-9F12-46D8-9D1D-CAC4451E01DE}</a:tableStyleId>
+                <a:tableStyleId>{83B64262-6560-4240-9E96-8B0D0E935F6A}</a:tableStyleId>
               </a:tblPr>
               <a:tblGrid>
                 <a:gridCol w="1973800"/>
@@ -6158,7 +6234,7 @@
       </p:graphicFrame>
       <p:sp>
         <p:nvSpPr>
-          <p:cNvPr id="85" name="Shape 85"/>
+          <p:cNvPr id="87" name="Shape 87"/>
           <p:cNvSpPr txBox="1"/>
           <p:nvPr/>
         </p:nvSpPr>
@@ -6202,7 +6278,7 @@
       </p:sp>
       <p:sp>
         <p:nvSpPr>
-          <p:cNvPr id="86" name="Shape 86"/>
+          <p:cNvPr id="88" name="Shape 88"/>
           <p:cNvSpPr txBox="1"/>
           <p:nvPr/>
         </p:nvSpPr>
@@ -6260,7 +6336,7 @@
   <p:cSld>
     <p:spTree>
       <p:nvGrpSpPr>
-        <p:cNvPr id="90" name="Shape 90"/>
+        <p:cNvPr id="92" name="Shape 92"/>
         <p:cNvGrpSpPr/>
         <p:nvPr/>
       </p:nvGrpSpPr>
@@ -6274,7 +6350,7 @@
       </p:grpSpPr>
       <p:sp>
         <p:nvSpPr>
-          <p:cNvPr id="91" name="Shape 91"/>
+          <p:cNvPr id="93" name="Shape 93"/>
           <p:cNvSpPr txBox="1"/>
           <p:nvPr>
             <p:ph type="title"/>
@@ -6310,7 +6386,7 @@
       </p:sp>
       <p:sp>
         <p:nvSpPr>
-          <p:cNvPr id="92" name="Shape 92"/>
+          <p:cNvPr id="94" name="Shape 94"/>
           <p:cNvSpPr txBox="1"/>
           <p:nvPr>
             <p:ph idx="1" type="body"/>

</xml_diff>